<commit_message>
Curso de Programação C# M1 C6 P1
</commit_message>
<xml_diff>
--- a/curso/modulo1capitulo6.pptx
+++ b/curso/modulo1capitulo6.pptx
@@ -510,7 +510,7 @@
             <a:fld id="{DC997751-B773-4FFE-B439-10C23787B14F}" type="datetimeFigureOut">
               <a:rPr lang="pt-BR" smtClean="0"/>
               <a:pPr/>
-              <a:t>8/11/2014</a:t>
+              <a:t>9/11/2014</a:t>
             </a:fld>
             <a:endParaRPr lang="pt-BR"/>
           </a:p>
@@ -677,7 +677,7 @@
             <a:fld id="{DC997751-B773-4FFE-B439-10C23787B14F}" type="datetimeFigureOut">
               <a:rPr lang="pt-BR" smtClean="0"/>
               <a:pPr/>
-              <a:t>8/11/2014</a:t>
+              <a:t>9/11/2014</a:t>
             </a:fld>
             <a:endParaRPr lang="pt-BR"/>
           </a:p>
@@ -854,7 +854,7 @@
             <a:fld id="{DC997751-B773-4FFE-B439-10C23787B14F}" type="datetimeFigureOut">
               <a:rPr lang="pt-BR" smtClean="0"/>
               <a:pPr/>
-              <a:t>8/11/2014</a:t>
+              <a:t>9/11/2014</a:t>
             </a:fld>
             <a:endParaRPr lang="pt-BR"/>
           </a:p>
@@ -1025,7 +1025,7 @@
             <a:fld id="{DC997751-B773-4FFE-B439-10C23787B14F}" type="datetimeFigureOut">
               <a:rPr lang="pt-BR" smtClean="0"/>
               <a:pPr/>
-              <a:t>8/11/2014</a:t>
+              <a:t>9/11/2014</a:t>
             </a:fld>
             <a:endParaRPr lang="pt-BR"/>
           </a:p>
@@ -1482,7 +1482,7 @@
             <a:fld id="{DC997751-B773-4FFE-B439-10C23787B14F}" type="datetimeFigureOut">
               <a:rPr lang="pt-BR" smtClean="0"/>
               <a:pPr/>
-              <a:t>8/11/2014</a:t>
+              <a:t>9/11/2014</a:t>
             </a:fld>
             <a:endParaRPr lang="pt-BR"/>
           </a:p>
@@ -1748,7 +1748,7 @@
             <a:fld id="{DC997751-B773-4FFE-B439-10C23787B14F}" type="datetimeFigureOut">
               <a:rPr lang="pt-BR" smtClean="0"/>
               <a:pPr/>
-              <a:t>8/11/2014</a:t>
+              <a:t>9/11/2014</a:t>
             </a:fld>
             <a:endParaRPr lang="pt-BR"/>
           </a:p>
@@ -2124,7 +2124,7 @@
             <a:fld id="{DC997751-B773-4FFE-B439-10C23787B14F}" type="datetimeFigureOut">
               <a:rPr lang="pt-BR" smtClean="0"/>
               <a:pPr/>
-              <a:t>8/11/2014</a:t>
+              <a:t>9/11/2014</a:t>
             </a:fld>
             <a:endParaRPr lang="pt-BR"/>
           </a:p>
@@ -2248,7 +2248,7 @@
             <a:fld id="{DC997751-B773-4FFE-B439-10C23787B14F}" type="datetimeFigureOut">
               <a:rPr lang="pt-BR" smtClean="0"/>
               <a:pPr/>
-              <a:t>8/11/2014</a:t>
+              <a:t>9/11/2014</a:t>
             </a:fld>
             <a:endParaRPr lang="pt-BR"/>
           </a:p>
@@ -2340,7 +2340,7 @@
             <a:fld id="{DC997751-B773-4FFE-B439-10C23787B14F}" type="datetimeFigureOut">
               <a:rPr lang="pt-BR" smtClean="0"/>
               <a:pPr/>
-              <a:t>8/11/2014</a:t>
+              <a:t>9/11/2014</a:t>
             </a:fld>
             <a:endParaRPr lang="pt-BR"/>
           </a:p>
@@ -2591,7 +2591,7 @@
             <a:fld id="{DC997751-B773-4FFE-B439-10C23787B14F}" type="datetimeFigureOut">
               <a:rPr lang="pt-BR" smtClean="0"/>
               <a:pPr/>
-              <a:t>8/11/2014</a:t>
+              <a:t>9/11/2014</a:t>
             </a:fld>
             <a:endParaRPr lang="pt-BR"/>
           </a:p>
@@ -2852,7 +2852,7 @@
             <a:fld id="{DC997751-B773-4FFE-B439-10C23787B14F}" type="datetimeFigureOut">
               <a:rPr lang="pt-BR" smtClean="0"/>
               <a:pPr/>
-              <a:t>8/11/2014</a:t>
+              <a:t>9/11/2014</a:t>
             </a:fld>
             <a:endParaRPr lang="pt-BR"/>
           </a:p>
@@ -3258,7 +3258,7 @@
             <a:fld id="{DC997751-B773-4FFE-B439-10C23787B14F}" type="datetimeFigureOut">
               <a:rPr lang="pt-BR" smtClean="0"/>
               <a:pPr/>
-              <a:t>8/11/2014</a:t>
+              <a:t>9/11/2014</a:t>
             </a:fld>
             <a:endParaRPr lang="pt-BR"/>
           </a:p>
@@ -3984,7 +3984,7 @@
       </p:sp>
       <p:pic>
         <p:nvPicPr>
-          <p:cNvPr id="3074" name="Picture 2"/>
+          <p:cNvPr id="1026" name="Picture 2"/>
           <p:cNvPicPr>
             <a:picLocks noChangeAspect="1" noChangeArrowheads="1"/>
           </p:cNvPicPr>
@@ -3999,8 +3999,8 @@
         </p:blipFill>
         <p:spPr bwMode="auto">
           <a:xfrm>
-            <a:off x="785786" y="1857364"/>
-            <a:ext cx="7370783" cy="4214842"/>
+            <a:off x="500034" y="1785926"/>
+            <a:ext cx="7766064" cy="4443706"/>
           </a:xfrm>
           <a:prstGeom prst="rect">
             <a:avLst/>
@@ -4443,14 +4443,7 @@
                 <a:latin typeface="Courier New" pitchFamily="49" charset="0"/>
                 <a:cs typeface="Courier New" pitchFamily="49" charset="0"/>
               </a:rPr>
-              <a:t>esparsa[0,0</a:t>
-            </a:r>
-            <a:r>
-              <a:rPr lang="pt-BR" b="1" dirty="0" smtClean="0">
-                <a:latin typeface="Courier New" pitchFamily="49" charset="0"/>
-                <a:cs typeface="Courier New" pitchFamily="49" charset="0"/>
-              </a:rPr>
-              <a:t>] = 35;</a:t>
+              <a:t>esparsa[0][0] = 35;</a:t>
             </a:r>
           </a:p>
           <a:p>
@@ -4460,14 +4453,7 @@
                 <a:latin typeface="Courier New" pitchFamily="49" charset="0"/>
                 <a:cs typeface="Courier New" pitchFamily="49" charset="0"/>
               </a:rPr>
-              <a:t>esparsa[0,1</a:t>
-            </a:r>
-            <a:r>
-              <a:rPr lang="pt-BR" b="1" dirty="0" smtClean="0">
-                <a:latin typeface="Courier New" pitchFamily="49" charset="0"/>
-                <a:cs typeface="Courier New" pitchFamily="49" charset="0"/>
-              </a:rPr>
-              <a:t>] = 57;</a:t>
+              <a:t>esparsa[0][1] = 57;</a:t>
             </a:r>
           </a:p>
           <a:p>
@@ -4477,14 +4463,7 @@
                 <a:latin typeface="Courier New" pitchFamily="49" charset="0"/>
                 <a:cs typeface="Courier New" pitchFamily="49" charset="0"/>
               </a:rPr>
-              <a:t>esparsa[2,3</a:t>
-            </a:r>
-            <a:r>
-              <a:rPr lang="pt-BR" b="1" dirty="0" smtClean="0">
-                <a:latin typeface="Courier New" pitchFamily="49" charset="0"/>
-                <a:cs typeface="Courier New" pitchFamily="49" charset="0"/>
-              </a:rPr>
-              <a:t>] = 701;</a:t>
+              <a:t>esparsa[2][3] = 701;</a:t>
             </a:r>
           </a:p>
           <a:p>
@@ -5212,14 +5191,7 @@
                 <a:latin typeface="Courier New" pitchFamily="49" charset="0"/>
                 <a:cs typeface="Courier New" pitchFamily="49" charset="0"/>
               </a:rPr>
-              <a:t>d</a:t>
-            </a:r>
-            <a:r>
-              <a:rPr lang="pt-BR" b="1" dirty="0" err="1" smtClean="0">
-                <a:latin typeface="Courier New" pitchFamily="49" charset="0"/>
-                <a:cs typeface="Courier New" pitchFamily="49" charset="0"/>
-              </a:rPr>
-              <a:t>inamica</a:t>
+              <a:t>dinamica</a:t>
             </a:r>
             <a:r>
               <a:rPr lang="pt-BR" b="1" dirty="0" smtClean="0">
@@ -7289,7 +7261,7 @@
         <p:spPr/>
         <p:txBody>
           <a:bodyPr>
-            <a:normAutofit lnSpcReduction="10000"/>
+            <a:normAutofit fontScale="92500" lnSpcReduction="10000"/>
           </a:bodyPr>
           <a:lstStyle/>
           <a:p>
@@ -7360,6 +7332,16 @@
                 <a:cs typeface="Courier New" pitchFamily="49" charset="0"/>
               </a:rPr>
               <a:t> j = 0; j &lt; m; j++)</a:t>
+            </a:r>
+          </a:p>
+          <a:p>
+            <a:pPr lvl="1"/>
+            <a:r>
+              <a:rPr lang="pt-BR" b="1" dirty="0" smtClean="0">
+                <a:latin typeface="Courier New" pitchFamily="49" charset="0"/>
+                <a:cs typeface="Courier New" pitchFamily="49" charset="0"/>
+              </a:rPr>
+              <a:t>{</a:t>
             </a:r>
           </a:p>
           <a:p>

</xml_diff>